<commit_message>
Little changes to playerstate&Checked the ppt and removed the problem that is already fixed
</commit_message>
<xml_diff>
--- a/Shared Files/SegmentPresentation.pptx
+++ b/Shared Files/SegmentPresentation.pptx
@@ -227,7 +227,7 @@
           <a:p>
             <a:fld id="{8906F081-8781-4431-8FD4-2CF608CD7C47}" type="datetimeFigureOut">
               <a:rPr lang="en-US" smtClean="0"/>
-              <a:t>10/25/2015</a:t>
+              <a:t>10/27/2015</a:t>
             </a:fld>
             <a:endParaRPr lang="en-US"/>
           </a:p>
@@ -392,7 +392,7 @@
           <a:p>
             <a:fld id="{F06CA47C-B7FD-4BE9-B0E6-81BA758D95F2}" type="datetimeFigureOut">
               <a:rPr lang="en-US" smtClean="0"/>
-              <a:t>10/25/2015</a:t>
+              <a:t>10/27/2015</a:t>
             </a:fld>
             <a:endParaRPr lang="en-US"/>
           </a:p>
@@ -930,7 +930,7 @@
           <a:p>
             <a:fld id="{33024136-D290-48F3-A182-4C46BEB5146B}" type="datetime1">
               <a:rPr lang="en-US" smtClean="0"/>
-              <a:t>10/25/2015</a:t>
+              <a:t>10/27/2015</a:t>
             </a:fld>
             <a:endParaRPr lang="en-US"/>
           </a:p>
@@ -1224,7 +1224,7 @@
           <a:p>
             <a:fld id="{4CD11720-76E7-46E6-B0AA-057287C42052}" type="datetime1">
               <a:rPr lang="en-US" smtClean="0"/>
-              <a:t>10/25/2015</a:t>
+              <a:t>10/27/2015</a:t>
             </a:fld>
             <a:endParaRPr lang="en-US"/>
           </a:p>
@@ -1419,7 +1419,7 @@
           <a:p>
             <a:fld id="{4CD11720-76E7-46E6-B0AA-057287C42052}" type="datetime1">
               <a:rPr lang="en-US" smtClean="0"/>
-              <a:t>10/25/2015</a:t>
+              <a:t>10/27/2015</a:t>
             </a:fld>
             <a:endParaRPr lang="en-US"/>
           </a:p>
@@ -1693,7 +1693,7 @@
           <a:p>
             <a:fld id="{4CD11720-76E7-46E6-B0AA-057287C42052}" type="datetime1">
               <a:rPr lang="en-US" smtClean="0"/>
-              <a:t>10/25/2015</a:t>
+              <a:t>10/27/2015</a:t>
             </a:fld>
             <a:endParaRPr lang="en-US"/>
           </a:p>
@@ -2035,7 +2035,7 @@
           <a:p>
             <a:fld id="{4CD11720-76E7-46E6-B0AA-057287C42052}" type="datetime1">
               <a:rPr lang="en-US" smtClean="0"/>
-              <a:t>10/25/2015</a:t>
+              <a:t>10/27/2015</a:t>
             </a:fld>
             <a:endParaRPr lang="en-US"/>
           </a:p>
@@ -2659,7 +2659,7 @@
           <a:p>
             <a:fld id="{4CD11720-76E7-46E6-B0AA-057287C42052}" type="datetime1">
               <a:rPr lang="en-US" smtClean="0"/>
-              <a:t>10/25/2015</a:t>
+              <a:t>10/27/2015</a:t>
             </a:fld>
             <a:endParaRPr lang="en-US"/>
           </a:p>
@@ -3520,7 +3520,7 @@
           <a:p>
             <a:fld id="{4CD11720-76E7-46E6-B0AA-057287C42052}" type="datetime1">
               <a:rPr lang="en-US" smtClean="0"/>
-              <a:t>10/25/2015</a:t>
+              <a:t>10/27/2015</a:t>
             </a:fld>
             <a:endParaRPr lang="en-US"/>
           </a:p>
@@ -3691,7 +3691,7 @@
           <a:p>
             <a:fld id="{9CC7D44C-38B1-4D0F-9006-D5774F331095}" type="datetime1">
               <a:rPr lang="en-US" smtClean="0"/>
-              <a:t>10/25/2015</a:t>
+              <a:t>10/27/2015</a:t>
             </a:fld>
             <a:endParaRPr lang="en-US"/>
           </a:p>
@@ -3890,7 +3890,7 @@
           <a:p>
             <a:fld id="{F98D518A-FD4F-4358-B95B-9DB5A17160FB}" type="datetime1">
               <a:rPr lang="en-US" smtClean="0"/>
-              <a:t>10/25/2015</a:t>
+              <a:t>10/27/2015</a:t>
             </a:fld>
             <a:endParaRPr lang="en-US"/>
           </a:p>
@@ -4079,7 +4079,7 @@
           <a:p>
             <a:fld id="{5E2A9F4F-03AD-4497-A65D-076601BD41D2}" type="datetime1">
               <a:rPr lang="en-US" smtClean="0"/>
-              <a:t>10/25/2015</a:t>
+              <a:t>10/27/2015</a:t>
             </a:fld>
             <a:endParaRPr lang="en-US"/>
           </a:p>
@@ -4345,7 +4345,7 @@
           <a:p>
             <a:fld id="{EDFBF3AC-A781-43AA-8BD5-B12F49168B94}" type="datetime1">
               <a:rPr lang="en-US" smtClean="0"/>
-              <a:t>10/25/2015</a:t>
+              <a:t>10/27/2015</a:t>
             </a:fld>
             <a:endParaRPr lang="en-US"/>
           </a:p>
@@ -4656,7 +4656,7 @@
           <a:p>
             <a:fld id="{C5256A41-C91B-43FF-9881-F5DA9878418F}" type="datetime1">
               <a:rPr lang="en-US" smtClean="0"/>
-              <a:t>10/25/2015</a:t>
+              <a:t>10/27/2015</a:t>
             </a:fld>
             <a:endParaRPr lang="en-US"/>
           </a:p>
@@ -5119,7 +5119,7 @@
           <a:p>
             <a:fld id="{FFD7AA76-41EE-4C13-950E-E611B8B8FC52}" type="datetime1">
               <a:rPr lang="en-US" smtClean="0"/>
-              <a:t>10/25/2015</a:t>
+              <a:t>10/27/2015</a:t>
             </a:fld>
             <a:endParaRPr lang="en-US"/>
           </a:p>
@@ -5256,7 +5256,7 @@
           <a:p>
             <a:fld id="{89407A26-E7BC-4498-97E4-87AF12377CA9}" type="datetime1">
               <a:rPr lang="en-US" smtClean="0"/>
-              <a:t>10/25/2015</a:t>
+              <a:t>10/27/2015</a:t>
             </a:fld>
             <a:endParaRPr lang="en-US"/>
           </a:p>
@@ -5370,7 +5370,7 @@
           <a:p>
             <a:fld id="{93EA4171-1117-4486-993C-35A7470D8847}" type="datetime1">
               <a:rPr lang="en-US" smtClean="0"/>
-              <a:t>10/25/2015</a:t>
+              <a:t>10/27/2015</a:t>
             </a:fld>
             <a:endParaRPr lang="en-US"/>
           </a:p>
@@ -5668,7 +5668,7 @@
           <a:p>
             <a:fld id="{472A4CB8-1563-4663-81DB-74EB416C19BE}" type="datetime1">
               <a:rPr lang="en-US" smtClean="0"/>
-              <a:t>10/25/2015</a:t>
+              <a:t>10/27/2015</a:t>
             </a:fld>
             <a:endParaRPr lang="en-US"/>
           </a:p>
@@ -5962,7 +5962,7 @@
           <a:p>
             <a:fld id="{0C6724CE-2468-448B-87C1-A92EDD78369B}" type="datetime1">
               <a:rPr lang="en-US" smtClean="0"/>
-              <a:t>10/25/2015</a:t>
+              <a:t>10/27/2015</a:t>
             </a:fld>
             <a:endParaRPr lang="en-US"/>
           </a:p>
@@ -6460,7 +6460,7 @@
           <a:p>
             <a:fld id="{4CD11720-76E7-46E6-B0AA-057287C42052}" type="datetime1">
               <a:rPr lang="en-US" smtClean="0"/>
-              <a:t>10/25/2015</a:t>
+              <a:t>10/27/2015</a:t>
             </a:fld>
             <a:endParaRPr lang="en-US"/>
           </a:p>
@@ -7569,13 +7569,13 @@
   <p:clrMapOvr>
     <a:masterClrMapping/>
   </p:clrMapOvr>
-  <mc:AlternateContent xmlns:mc="http://schemas.openxmlformats.org/markup-compatibility/2006">
-    <mc:Choice xmlns:p14="http://schemas.microsoft.com/office/powerpoint/2010/main" Requires="p14">
+  <mc:AlternateContent xmlns:mc="http://schemas.openxmlformats.org/markup-compatibility/2006" xmlns:p14="http://schemas.microsoft.com/office/powerpoint/2010/main">
+    <mc:Choice Requires="p14">
       <p:transition spd="med" p14:dur="700">
         <p:fade/>
       </p:transition>
     </mc:Choice>
-    <mc:Fallback>
+    <mc:Fallback xmlns="">
       <p:transition spd="med">
         <p:fade/>
       </p:transition>
@@ -7743,13 +7743,13 @@
   <p:clrMapOvr>
     <a:masterClrMapping/>
   </p:clrMapOvr>
-  <mc:AlternateContent xmlns:mc="http://schemas.openxmlformats.org/markup-compatibility/2006">
-    <mc:Choice xmlns:p14="http://schemas.microsoft.com/office/powerpoint/2010/main" Requires="p14">
+  <mc:AlternateContent xmlns:mc="http://schemas.openxmlformats.org/markup-compatibility/2006" xmlns:p14="http://schemas.microsoft.com/office/powerpoint/2010/main">
+    <mc:Choice Requires="p14">
       <p:transition spd="med" p14:dur="700">
         <p:fade/>
       </p:transition>
     </mc:Choice>
-    <mc:Fallback>
+    <mc:Fallback xmlns="">
       <p:transition spd="med">
         <p:fade/>
       </p:transition>
@@ -8085,13 +8085,11 @@
           <a:p>
             <a:r>
               <a:rPr lang="en-US" sz="2800" dirty="0" smtClean="0"/>
-              <a:t>Problems with player colliding with static objects</a:t>
-            </a:r>
-          </a:p>
-          <a:p>
+              <a:t>We’ve </a:t>
+            </a:r>
             <a:r>
               <a:rPr lang="en-US" sz="2800" dirty="0" smtClean="0"/>
-              <a:t>We’ve been going to Row “S” to get help constantly</a:t>
+              <a:t>been going to Row “S” to get help constantly</a:t>
             </a:r>
             <a:endParaRPr lang="en-US" sz="2800" dirty="0"/>
           </a:p>
@@ -8576,7 +8574,6 @@
               <a:rPr lang="en-US" sz="2800" dirty="0" smtClean="0"/>
               <a:t>Browsed the school forums for Sound students with no luck</a:t>
             </a:r>
-            <a:endParaRPr lang="en-US" sz="2800" dirty="0" smtClean="0"/>
           </a:p>
           <a:p>
             <a:r>

</xml_diff>

<commit_message>
Edited one slide of the ppt on rish & mitigation. (@Josh)
</commit_message>
<xml_diff>
--- a/Shared Files/SegmentPresentation.pptx
+++ b/Shared Files/SegmentPresentation.pptx
@@ -8073,23 +8073,34 @@
           <a:p>
             <a:r>
               <a:rPr lang="en-US" sz="2800" dirty="0" smtClean="0"/>
-              <a:t>Needed to rewrite the whole physics engine</a:t>
-            </a:r>
-          </a:p>
-          <a:p>
+              <a:t>Rewrote the </a:t>
+            </a:r>
             <a:r>
               <a:rPr lang="en-US" sz="2800" dirty="0" smtClean="0"/>
-              <a:t>Tile map collision isn’t finished</a:t>
-            </a:r>
-          </a:p>
-          <a:p>
+              <a:t>whole physics </a:t>
+            </a:r>
             <a:r>
               <a:rPr lang="en-US" sz="2800" dirty="0" smtClean="0"/>
-              <a:t>We’ve </a:t>
+              <a:t>engine</a:t>
+            </a:r>
+            <a:endParaRPr lang="en-US" sz="2800" dirty="0" smtClean="0"/>
+          </a:p>
+          <a:p>
+            <a:r>
+              <a:rPr lang="en-US" sz="2800" smtClean="0"/>
+              <a:t>Having trouble </a:t>
+            </a:r>
+            <a:r>
+              <a:rPr lang="en-US" sz="2800" smtClean="0"/>
+              <a:t>Integrate </a:t>
+            </a:r>
+            <a:r>
+              <a:rPr lang="en-US" sz="2800" dirty="0" err="1" smtClean="0"/>
+              <a:t>Lua</a:t>
             </a:r>
             <a:r>
               <a:rPr lang="en-US" sz="2800" dirty="0" smtClean="0"/>
-              <a:t>been going to Row “S” to get help constantly</a:t>
+              <a:t> editor with our game engine.</a:t>
             </a:r>
             <a:endParaRPr lang="en-US" sz="2800" dirty="0"/>
           </a:p>

</xml_diff>

<commit_message>
Messed with presentation stuff, and was able to fix the quit game issue with the prototype (thanks to Zilch-Master Supreme Johannes). Still working on the dynamic HUD problem, but will probably use default positions for presentation just in case.
</commit_message>
<xml_diff>
--- a/Shared Files/SegmentPresentation.pptx
+++ b/Shared Files/SegmentPresentation.pptx
@@ -227,7 +227,7 @@
           <a:p>
             <a:fld id="{8906F081-8781-4431-8FD4-2CF608CD7C47}" type="datetimeFigureOut">
               <a:rPr lang="en-US" smtClean="0"/>
-              <a:t>10/25/2015</a:t>
+              <a:t>10/28/2015</a:t>
             </a:fld>
             <a:endParaRPr lang="en-US"/>
           </a:p>
@@ -392,7 +392,7 @@
           <a:p>
             <a:fld id="{F06CA47C-B7FD-4BE9-B0E6-81BA758D95F2}" type="datetimeFigureOut">
               <a:rPr lang="en-US" smtClean="0"/>
-              <a:t>10/25/2015</a:t>
+              <a:t>10/28/2015</a:t>
             </a:fld>
             <a:endParaRPr lang="en-US"/>
           </a:p>
@@ -930,7 +930,7 @@
           <a:p>
             <a:fld id="{33024136-D290-48F3-A182-4C46BEB5146B}" type="datetime1">
               <a:rPr lang="en-US" smtClean="0"/>
-              <a:t>10/25/2015</a:t>
+              <a:t>10/28/2015</a:t>
             </a:fld>
             <a:endParaRPr lang="en-US"/>
           </a:p>
@@ -1224,7 +1224,7 @@
           <a:p>
             <a:fld id="{4CD11720-76E7-46E6-B0AA-057287C42052}" type="datetime1">
               <a:rPr lang="en-US" smtClean="0"/>
-              <a:t>10/25/2015</a:t>
+              <a:t>10/28/2015</a:t>
             </a:fld>
             <a:endParaRPr lang="en-US"/>
           </a:p>
@@ -1419,7 +1419,7 @@
           <a:p>
             <a:fld id="{4CD11720-76E7-46E6-B0AA-057287C42052}" type="datetime1">
               <a:rPr lang="en-US" smtClean="0"/>
-              <a:t>10/25/2015</a:t>
+              <a:t>10/28/2015</a:t>
             </a:fld>
             <a:endParaRPr lang="en-US"/>
           </a:p>
@@ -1693,7 +1693,7 @@
           <a:p>
             <a:fld id="{4CD11720-76E7-46E6-B0AA-057287C42052}" type="datetime1">
               <a:rPr lang="en-US" smtClean="0"/>
-              <a:t>10/25/2015</a:t>
+              <a:t>10/28/2015</a:t>
             </a:fld>
             <a:endParaRPr lang="en-US"/>
           </a:p>
@@ -2035,7 +2035,7 @@
           <a:p>
             <a:fld id="{4CD11720-76E7-46E6-B0AA-057287C42052}" type="datetime1">
               <a:rPr lang="en-US" smtClean="0"/>
-              <a:t>10/25/2015</a:t>
+              <a:t>10/28/2015</a:t>
             </a:fld>
             <a:endParaRPr lang="en-US"/>
           </a:p>
@@ -2659,7 +2659,7 @@
           <a:p>
             <a:fld id="{4CD11720-76E7-46E6-B0AA-057287C42052}" type="datetime1">
               <a:rPr lang="en-US" smtClean="0"/>
-              <a:t>10/25/2015</a:t>
+              <a:t>10/28/2015</a:t>
             </a:fld>
             <a:endParaRPr lang="en-US"/>
           </a:p>
@@ -3520,7 +3520,7 @@
           <a:p>
             <a:fld id="{4CD11720-76E7-46E6-B0AA-057287C42052}" type="datetime1">
               <a:rPr lang="en-US" smtClean="0"/>
-              <a:t>10/25/2015</a:t>
+              <a:t>10/28/2015</a:t>
             </a:fld>
             <a:endParaRPr lang="en-US"/>
           </a:p>
@@ -3691,7 +3691,7 @@
           <a:p>
             <a:fld id="{9CC7D44C-38B1-4D0F-9006-D5774F331095}" type="datetime1">
               <a:rPr lang="en-US" smtClean="0"/>
-              <a:t>10/25/2015</a:t>
+              <a:t>10/28/2015</a:t>
             </a:fld>
             <a:endParaRPr lang="en-US"/>
           </a:p>
@@ -3890,7 +3890,7 @@
           <a:p>
             <a:fld id="{F98D518A-FD4F-4358-B95B-9DB5A17160FB}" type="datetime1">
               <a:rPr lang="en-US" smtClean="0"/>
-              <a:t>10/25/2015</a:t>
+              <a:t>10/28/2015</a:t>
             </a:fld>
             <a:endParaRPr lang="en-US"/>
           </a:p>
@@ -4079,7 +4079,7 @@
           <a:p>
             <a:fld id="{5E2A9F4F-03AD-4497-A65D-076601BD41D2}" type="datetime1">
               <a:rPr lang="en-US" smtClean="0"/>
-              <a:t>10/25/2015</a:t>
+              <a:t>10/28/2015</a:t>
             </a:fld>
             <a:endParaRPr lang="en-US"/>
           </a:p>
@@ -4345,7 +4345,7 @@
           <a:p>
             <a:fld id="{EDFBF3AC-A781-43AA-8BD5-B12F49168B94}" type="datetime1">
               <a:rPr lang="en-US" smtClean="0"/>
-              <a:t>10/25/2015</a:t>
+              <a:t>10/28/2015</a:t>
             </a:fld>
             <a:endParaRPr lang="en-US"/>
           </a:p>
@@ -4656,7 +4656,7 @@
           <a:p>
             <a:fld id="{C5256A41-C91B-43FF-9881-F5DA9878418F}" type="datetime1">
               <a:rPr lang="en-US" smtClean="0"/>
-              <a:t>10/25/2015</a:t>
+              <a:t>10/28/2015</a:t>
             </a:fld>
             <a:endParaRPr lang="en-US"/>
           </a:p>
@@ -5119,7 +5119,7 @@
           <a:p>
             <a:fld id="{FFD7AA76-41EE-4C13-950E-E611B8B8FC52}" type="datetime1">
               <a:rPr lang="en-US" smtClean="0"/>
-              <a:t>10/25/2015</a:t>
+              <a:t>10/28/2015</a:t>
             </a:fld>
             <a:endParaRPr lang="en-US"/>
           </a:p>
@@ -5256,7 +5256,7 @@
           <a:p>
             <a:fld id="{89407A26-E7BC-4498-97E4-87AF12377CA9}" type="datetime1">
               <a:rPr lang="en-US" smtClean="0"/>
-              <a:t>10/25/2015</a:t>
+              <a:t>10/28/2015</a:t>
             </a:fld>
             <a:endParaRPr lang="en-US"/>
           </a:p>
@@ -5370,7 +5370,7 @@
           <a:p>
             <a:fld id="{93EA4171-1117-4486-993C-35A7470D8847}" type="datetime1">
               <a:rPr lang="en-US" smtClean="0"/>
-              <a:t>10/25/2015</a:t>
+              <a:t>10/28/2015</a:t>
             </a:fld>
             <a:endParaRPr lang="en-US"/>
           </a:p>
@@ -5668,7 +5668,7 @@
           <a:p>
             <a:fld id="{472A4CB8-1563-4663-81DB-74EB416C19BE}" type="datetime1">
               <a:rPr lang="en-US" smtClean="0"/>
-              <a:t>10/25/2015</a:t>
+              <a:t>10/28/2015</a:t>
             </a:fld>
             <a:endParaRPr lang="en-US"/>
           </a:p>
@@ -5962,7 +5962,7 @@
           <a:p>
             <a:fld id="{0C6724CE-2468-448B-87C1-A92EDD78369B}" type="datetime1">
               <a:rPr lang="en-US" smtClean="0"/>
-              <a:t>10/25/2015</a:t>
+              <a:t>10/28/2015</a:t>
             </a:fld>
             <a:endParaRPr lang="en-US"/>
           </a:p>
@@ -6460,7 +6460,7 @@
           <a:p>
             <a:fld id="{4CD11720-76E7-46E6-B0AA-057287C42052}" type="datetime1">
               <a:rPr lang="en-US" smtClean="0"/>
-              <a:t>10/25/2015</a:t>
+              <a:t>10/28/2015</a:t>
             </a:fld>
             <a:endParaRPr lang="en-US"/>
           </a:p>
@@ -7428,7 +7428,7 @@
         </p:nvSpPr>
         <p:spPr>
           <a:xfrm>
-            <a:off x="646111" y="452718"/>
+            <a:off x="982996" y="131876"/>
             <a:ext cx="9404723" cy="1062183"/>
           </a:xfrm>
         </p:spPr>
@@ -7445,25 +7445,1134 @@
           </a:p>
         </p:txBody>
       </p:sp>
-      <p:sp>
-        <p:nvSpPr>
-          <p:cNvPr id="3" name="Content Placeholder 2"/>
-          <p:cNvSpPr>
-            <a:spLocks noGrp="1"/>
-          </p:cNvSpPr>
-          <p:nvPr>
-            <p:ph idx="1"/>
-          </p:nvPr>
-        </p:nvSpPr>
-        <p:spPr/>
-        <p:txBody>
-          <a:bodyPr/>
-          <a:lstStyle/>
-          <a:p>
-            <a:endParaRPr lang="en-US" dirty="0"/>
-          </a:p>
-        </p:txBody>
-      </p:sp>
+      <p:graphicFrame>
+        <p:nvGraphicFramePr>
+          <p:cNvPr id="5" name="Table 4"/>
+          <p:cNvGraphicFramePr>
+            <a:graphicFrameLocks noGrp="1"/>
+          </p:cNvGraphicFramePr>
+          <p:nvPr>
+            <p:extLst>
+              <p:ext uri="{D42A27DB-BD31-4B8C-83A1-F6EECF244321}">
+                <p14:modId xmlns:p14="http://schemas.microsoft.com/office/powerpoint/2010/main" val="2420941264"/>
+              </p:ext>
+            </p:extLst>
+          </p:nvPr>
+        </p:nvGraphicFramePr>
+        <p:xfrm>
+          <a:off x="354228" y="1049680"/>
+          <a:ext cx="11483544" cy="5679807"/>
+        </p:xfrm>
+        <a:graphic>
+          <a:graphicData uri="http://schemas.openxmlformats.org/drawingml/2006/table">
+            <a:tbl>
+              <a:tblPr firstRow="1" bandRow="1">
+                <a:tableStyleId>{5C22544A-7EE6-4342-B048-85BDC9FD1C3A}</a:tableStyleId>
+              </a:tblPr>
+              <a:tblGrid>
+                <a:gridCol w="1089561"/>
+                <a:gridCol w="1572127"/>
+                <a:gridCol w="1524000"/>
+                <a:gridCol w="1556084"/>
+                <a:gridCol w="1435443"/>
+                <a:gridCol w="1435443"/>
+                <a:gridCol w="1435443"/>
+                <a:gridCol w="1435443"/>
+              </a:tblGrid>
+              <a:tr h="666825">
+                <a:tc>
+                  <a:txBody>
+                    <a:bodyPr/>
+                    <a:lstStyle/>
+                    <a:p>
+                      <a:pPr algn="ctr"/>
+                      <a:endParaRPr lang="en-US" dirty="0"/>
+                    </a:p>
+                  </a:txBody>
+                  <a:tcPr/>
+                </a:tc>
+                <a:tc>
+                  <a:txBody>
+                    <a:bodyPr/>
+                    <a:lstStyle/>
+                    <a:p>
+                      <a:pPr algn="ctr"/>
+                      <a:r>
+                        <a:rPr lang="en-US" dirty="0" smtClean="0"/>
+                        <a:t>Josh</a:t>
+                      </a:r>
+                      <a:endParaRPr lang="en-US" dirty="0"/>
+                    </a:p>
+                  </a:txBody>
+                  <a:tcPr/>
+                </a:tc>
+                <a:tc>
+                  <a:txBody>
+                    <a:bodyPr/>
+                    <a:lstStyle/>
+                    <a:p>
+                      <a:pPr algn="ctr"/>
+                      <a:r>
+                        <a:rPr lang="en-US" dirty="0" smtClean="0"/>
+                        <a:t>Nolan</a:t>
+                      </a:r>
+                      <a:endParaRPr lang="en-US" dirty="0"/>
+                    </a:p>
+                  </a:txBody>
+                  <a:tcPr/>
+                </a:tc>
+                <a:tc>
+                  <a:txBody>
+                    <a:bodyPr/>
+                    <a:lstStyle/>
+                    <a:p>
+                      <a:pPr algn="ctr"/>
+                      <a:r>
+                        <a:rPr lang="en-US" dirty="0" smtClean="0"/>
+                        <a:t>Mitch</a:t>
+                      </a:r>
+                      <a:endParaRPr lang="en-US" dirty="0"/>
+                    </a:p>
+                  </a:txBody>
+                  <a:tcPr/>
+                </a:tc>
+                <a:tc>
+                  <a:txBody>
+                    <a:bodyPr/>
+                    <a:lstStyle/>
+                    <a:p>
+                      <a:pPr algn="ctr"/>
+                      <a:r>
+                        <a:rPr lang="en-US" dirty="0" err="1" smtClean="0"/>
+                        <a:t>Conor</a:t>
+                      </a:r>
+                      <a:endParaRPr lang="en-US" dirty="0"/>
+                    </a:p>
+                  </a:txBody>
+                  <a:tcPr/>
+                </a:tc>
+                <a:tc>
+                  <a:txBody>
+                    <a:bodyPr/>
+                    <a:lstStyle/>
+                    <a:p>
+                      <a:pPr algn="ctr"/>
+                      <a:r>
+                        <a:rPr lang="en-US" dirty="0" smtClean="0"/>
+                        <a:t>Gabe</a:t>
+                      </a:r>
+                      <a:endParaRPr lang="en-US" dirty="0"/>
+                    </a:p>
+                  </a:txBody>
+                  <a:tcPr/>
+                </a:tc>
+                <a:tc>
+                  <a:txBody>
+                    <a:bodyPr/>
+                    <a:lstStyle/>
+                    <a:p>
+                      <a:pPr algn="ctr"/>
+                      <a:r>
+                        <a:rPr lang="en-US" dirty="0" err="1" smtClean="0"/>
+                        <a:t>Jiangdi</a:t>
+                      </a:r>
+                      <a:endParaRPr lang="en-US" dirty="0"/>
+                    </a:p>
+                  </a:txBody>
+                  <a:tcPr/>
+                </a:tc>
+                <a:tc>
+                  <a:txBody>
+                    <a:bodyPr/>
+                    <a:lstStyle/>
+                    <a:p>
+                      <a:pPr algn="ctr"/>
+                      <a:r>
+                        <a:rPr lang="en-US" dirty="0" smtClean="0"/>
+                        <a:t>Mariah &amp; Casey</a:t>
+                      </a:r>
+                      <a:endParaRPr lang="en-US" dirty="0"/>
+                    </a:p>
+                  </a:txBody>
+                  <a:tcPr/>
+                </a:tc>
+              </a:tr>
+              <a:tr h="875811">
+                <a:tc>
+                  <a:txBody>
+                    <a:bodyPr/>
+                    <a:lstStyle/>
+                    <a:p>
+                      <a:pPr algn="ctr"/>
+                      <a:r>
+                        <a:rPr lang="en-US" sz="1400" b="1" dirty="0" smtClean="0">
+                          <a:solidFill>
+                            <a:schemeClr val="bg1"/>
+                          </a:solidFill>
+                        </a:rPr>
+                        <a:t>Week 10</a:t>
+                      </a:r>
+                      <a:endParaRPr lang="en-US" sz="1400" b="1" dirty="0">
+                        <a:solidFill>
+                          <a:schemeClr val="bg1"/>
+                        </a:solidFill>
+                      </a:endParaRPr>
+                    </a:p>
+                  </a:txBody>
+                  <a:tcPr/>
+                </a:tc>
+                <a:tc>
+                  <a:txBody>
+                    <a:bodyPr/>
+                    <a:lstStyle/>
+                    <a:p>
+                      <a:pPr algn="ctr"/>
+                      <a:r>
+                        <a:rPr lang="en-US" sz="1400" dirty="0" smtClean="0"/>
+                        <a:t>Implement Actions</a:t>
+                      </a:r>
+                      <a:endParaRPr lang="en-US" sz="1400" dirty="0"/>
+                    </a:p>
+                  </a:txBody>
+                  <a:tcPr/>
+                </a:tc>
+                <a:tc>
+                  <a:txBody>
+                    <a:bodyPr/>
+                    <a:lstStyle/>
+                    <a:p>
+                      <a:pPr algn="ctr"/>
+                      <a:r>
+                        <a:rPr lang="en-US" sz="1400" dirty="0" smtClean="0"/>
+                        <a:t>Extend</a:t>
+                      </a:r>
+                      <a:r>
+                        <a:rPr lang="en-US" sz="1400" baseline="0" dirty="0" smtClean="0"/>
+                        <a:t> </a:t>
+                      </a:r>
+                      <a:r>
+                        <a:rPr lang="en-US" sz="1400" dirty="0" smtClean="0"/>
+                        <a:t>GUI, threading</a:t>
+                      </a:r>
+                      <a:r>
+                        <a:rPr lang="en-US" sz="1400" baseline="0" dirty="0" smtClean="0"/>
+                        <a:t> </a:t>
+                      </a:r>
+                      <a:r>
+                        <a:rPr lang="en-US" sz="1400" baseline="0" dirty="0" err="1" smtClean="0"/>
+                        <a:t>Lua</a:t>
+                      </a:r>
+                      <a:r>
+                        <a:rPr lang="en-US" sz="1400" baseline="0" dirty="0" smtClean="0"/>
+                        <a:t>, messaging redo</a:t>
+                      </a:r>
+                      <a:endParaRPr lang="en-US" sz="1400" dirty="0"/>
+                    </a:p>
+                  </a:txBody>
+                  <a:tcPr/>
+                </a:tc>
+                <a:tc>
+                  <a:txBody>
+                    <a:bodyPr/>
+                    <a:lstStyle/>
+                    <a:p>
+                      <a:pPr algn="ctr"/>
+                      <a:r>
+                        <a:rPr lang="en-US" sz="1400" dirty="0" smtClean="0"/>
+                        <a:t>GUI documents,</a:t>
+                      </a:r>
+                      <a:r>
+                        <a:rPr lang="en-US" sz="1400" baseline="0" dirty="0" smtClean="0"/>
+                        <a:t> prototype wrap-up</a:t>
+                      </a:r>
+                      <a:endParaRPr lang="en-US" sz="1400" dirty="0"/>
+                    </a:p>
+                  </a:txBody>
+                  <a:tcPr/>
+                </a:tc>
+                <a:tc>
+                  <a:txBody>
+                    <a:bodyPr/>
+                    <a:lstStyle/>
+                    <a:p>
+                      <a:pPr algn="ctr"/>
+                      <a:r>
+                        <a:rPr lang="en-US" sz="1400" dirty="0" smtClean="0"/>
+                        <a:t>Secondary</a:t>
+                      </a:r>
+                      <a:r>
+                        <a:rPr lang="en-US" sz="1400" baseline="0" dirty="0" smtClean="0"/>
+                        <a:t> debug console for input, messaging redo</a:t>
+                      </a:r>
+                      <a:endParaRPr lang="en-US" sz="1400" dirty="0"/>
+                    </a:p>
+                  </a:txBody>
+                  <a:tcPr/>
+                </a:tc>
+                <a:tc>
+                  <a:txBody>
+                    <a:bodyPr/>
+                    <a:lstStyle/>
+                    <a:p>
+                      <a:pPr algn="ctr"/>
+                      <a:r>
+                        <a:rPr lang="en-US" sz="1400" dirty="0" smtClean="0"/>
+                        <a:t>Threading + documenting the other individual</a:t>
+                      </a:r>
+                      <a:r>
+                        <a:rPr lang="en-US" sz="1400" baseline="0" dirty="0" smtClean="0"/>
+                        <a:t> systems</a:t>
+                      </a:r>
+                      <a:endParaRPr lang="en-US" sz="1400" dirty="0"/>
+                    </a:p>
+                  </a:txBody>
+                  <a:tcPr/>
+                </a:tc>
+                <a:tc>
+                  <a:txBody>
+                    <a:bodyPr/>
+                    <a:lstStyle/>
+                    <a:p>
+                      <a:pPr algn="ctr"/>
+                      <a:r>
+                        <a:rPr lang="en-US" sz="1400" dirty="0" smtClean="0"/>
+                        <a:t>Documenting physics, streamlining physics</a:t>
+                      </a:r>
+                      <a:endParaRPr lang="en-US" sz="1400" dirty="0"/>
+                    </a:p>
+                  </a:txBody>
+                  <a:tcPr/>
+                </a:tc>
+                <a:tc>
+                  <a:txBody>
+                    <a:bodyPr/>
+                    <a:lstStyle/>
+                    <a:p>
+                      <a:pPr algn="ctr"/>
+                      <a:r>
+                        <a:rPr lang="en-US" sz="1400" dirty="0" smtClean="0"/>
+                        <a:t>Background art, player</a:t>
+                      </a:r>
+                      <a:r>
+                        <a:rPr lang="en-US" sz="1400" baseline="0" dirty="0" smtClean="0"/>
+                        <a:t> walk/attack, enemy sprites</a:t>
+                      </a:r>
+                      <a:endParaRPr lang="en-US" sz="1400" dirty="0"/>
+                    </a:p>
+                  </a:txBody>
+                  <a:tcPr/>
+                </a:tc>
+              </a:tr>
+              <a:tr h="875811">
+                <a:tc>
+                  <a:txBody>
+                    <a:bodyPr/>
+                    <a:lstStyle/>
+                    <a:p>
+                      <a:pPr algn="ctr"/>
+                      <a:r>
+                        <a:rPr lang="en-US" sz="1400" b="1" dirty="0" smtClean="0">
+                          <a:solidFill>
+                            <a:schemeClr val="bg1"/>
+                          </a:solidFill>
+                        </a:rPr>
+                        <a:t>Week</a:t>
+                      </a:r>
+                      <a:r>
+                        <a:rPr lang="en-US" sz="1400" b="1" baseline="0" dirty="0" smtClean="0">
+                          <a:solidFill>
+                            <a:schemeClr val="bg1"/>
+                          </a:solidFill>
+                        </a:rPr>
+                        <a:t> 11</a:t>
+                      </a:r>
+                      <a:endParaRPr lang="en-US" sz="1400" b="1" dirty="0">
+                        <a:solidFill>
+                          <a:schemeClr val="bg1"/>
+                        </a:solidFill>
+                      </a:endParaRPr>
+                    </a:p>
+                  </a:txBody>
+                  <a:tcPr/>
+                </a:tc>
+                <a:tc>
+                  <a:txBody>
+                    <a:bodyPr/>
+                    <a:lstStyle/>
+                    <a:p>
+                      <a:pPr algn="ctr"/>
+                      <a:r>
+                        <a:rPr lang="en-US" sz="1400" dirty="0" smtClean="0"/>
+                        <a:t>Refine</a:t>
+                      </a:r>
+                      <a:r>
+                        <a:rPr lang="en-US" sz="1400" baseline="0" dirty="0" smtClean="0"/>
+                        <a:t> Actions</a:t>
+                      </a:r>
+                      <a:endParaRPr lang="en-US" sz="1400" dirty="0"/>
+                    </a:p>
+                  </a:txBody>
+                  <a:tcPr/>
+                </a:tc>
+                <a:tc>
+                  <a:txBody>
+                    <a:bodyPr/>
+                    <a:lstStyle/>
+                    <a:p>
+                      <a:pPr algn="ctr"/>
+                      <a:r>
+                        <a:rPr lang="en-US" sz="1400" dirty="0" smtClean="0"/>
+                        <a:t>Add IMGUI, FMOD tools</a:t>
+                      </a:r>
+                      <a:endParaRPr lang="en-US" sz="1400" dirty="0"/>
+                    </a:p>
+                  </a:txBody>
+                  <a:tcPr/>
+                </a:tc>
+                <a:tc>
+                  <a:txBody>
+                    <a:bodyPr/>
+                    <a:lstStyle/>
+                    <a:p>
+                      <a:pPr algn="ctr"/>
+                      <a:r>
+                        <a:rPr lang="en-US" sz="1400" dirty="0" smtClean="0"/>
+                        <a:t>Entity/Component scripting</a:t>
+                      </a:r>
+                      <a:endParaRPr lang="en-US" sz="1400" dirty="0"/>
+                    </a:p>
+                  </a:txBody>
+                  <a:tcPr/>
+                </a:tc>
+                <a:tc>
+                  <a:txBody>
+                    <a:bodyPr/>
+                    <a:lstStyle/>
+                    <a:p>
+                      <a:pPr algn="ctr"/>
+                      <a:r>
+                        <a:rPr lang="en-US" sz="1400" dirty="0" smtClean="0"/>
+                        <a:t>Particles, messaging redo</a:t>
+                      </a:r>
+                      <a:endParaRPr lang="en-US" sz="1400" dirty="0"/>
+                    </a:p>
+                  </a:txBody>
+                  <a:tcPr/>
+                </a:tc>
+                <a:tc>
+                  <a:txBody>
+                    <a:bodyPr/>
+                    <a:lstStyle/>
+                    <a:p>
+                      <a:pPr algn="ctr"/>
+                      <a:r>
+                        <a:rPr lang="en-US" sz="1400" dirty="0" smtClean="0"/>
+                        <a:t>Cleaning memory</a:t>
+                      </a:r>
+                      <a:r>
+                        <a:rPr lang="en-US" sz="1400" baseline="0" dirty="0" smtClean="0"/>
+                        <a:t> leaks</a:t>
+                      </a:r>
+                      <a:endParaRPr lang="en-US" sz="1400" dirty="0"/>
+                    </a:p>
+                  </a:txBody>
+                  <a:tcPr/>
+                </a:tc>
+                <a:tc>
+                  <a:txBody>
+                    <a:bodyPr/>
+                    <a:lstStyle/>
+                    <a:p>
+                      <a:pPr algn="ctr"/>
+                      <a:r>
+                        <a:rPr lang="en-US" sz="1400" dirty="0" smtClean="0"/>
+                        <a:t>Ray-casting</a:t>
+                      </a:r>
+                      <a:endParaRPr lang="en-US" sz="1400" dirty="0"/>
+                    </a:p>
+                  </a:txBody>
+                  <a:tcPr/>
+                </a:tc>
+                <a:tc>
+                  <a:txBody>
+                    <a:bodyPr/>
+                    <a:lstStyle/>
+                    <a:p>
+                      <a:pPr marL="0" marR="0" indent="0" algn="ctr" defTabSz="457200" rtl="0" eaLnBrk="1" fontAlgn="auto" latinLnBrk="0" hangingPunct="1">
+                        <a:lnSpc>
+                          <a:spcPct val="100000"/>
+                        </a:lnSpc>
+                        <a:spcBef>
+                          <a:spcPts val="0"/>
+                        </a:spcBef>
+                        <a:spcAft>
+                          <a:spcPts val="0"/>
+                        </a:spcAft>
+                        <a:buClrTx/>
+                        <a:buSzTx/>
+                        <a:buFontTx/>
+                        <a:buNone/>
+                        <a:tabLst/>
+                        <a:defRPr/>
+                      </a:pPr>
+                      <a:r>
+                        <a:rPr lang="en-US" sz="1400" dirty="0" smtClean="0"/>
+                        <a:t>Background art, player</a:t>
+                      </a:r>
+                      <a:r>
+                        <a:rPr lang="en-US" sz="1400" baseline="0" dirty="0" smtClean="0"/>
+                        <a:t> animations, UI/Scroll art</a:t>
+                      </a:r>
+                      <a:endParaRPr lang="en-US" sz="1400" dirty="0" smtClean="0"/>
+                    </a:p>
+                  </a:txBody>
+                  <a:tcPr/>
+                </a:tc>
+              </a:tr>
+              <a:tr h="875811">
+                <a:tc>
+                  <a:txBody>
+                    <a:bodyPr/>
+                    <a:lstStyle/>
+                    <a:p>
+                      <a:pPr algn="ctr"/>
+                      <a:r>
+                        <a:rPr lang="en-US" sz="1400" b="1" dirty="0" smtClean="0">
+                          <a:solidFill>
+                            <a:schemeClr val="bg1"/>
+                          </a:solidFill>
+                        </a:rPr>
+                        <a:t>Week 12</a:t>
+                      </a:r>
+                      <a:endParaRPr lang="en-US" sz="1400" b="1" dirty="0">
+                        <a:solidFill>
+                          <a:schemeClr val="bg1"/>
+                        </a:solidFill>
+                      </a:endParaRPr>
+                    </a:p>
+                  </a:txBody>
+                  <a:tcPr/>
+                </a:tc>
+                <a:tc>
+                  <a:txBody>
+                    <a:bodyPr/>
+                    <a:lstStyle/>
+                    <a:p>
+                      <a:pPr algn="ctr"/>
+                      <a:r>
+                        <a:rPr lang="en-US" sz="1400" dirty="0" err="1" smtClean="0"/>
+                        <a:t>Lua</a:t>
+                      </a:r>
+                      <a:r>
+                        <a:rPr lang="en-US" sz="1400" dirty="0" smtClean="0"/>
+                        <a:t> Delegates</a:t>
+                      </a:r>
+                      <a:endParaRPr lang="en-US" sz="1400" dirty="0"/>
+                    </a:p>
+                  </a:txBody>
+                  <a:tcPr/>
+                </a:tc>
+                <a:tc>
+                  <a:txBody>
+                    <a:bodyPr/>
+                    <a:lstStyle/>
+                    <a:p>
+                      <a:pPr algn="ctr"/>
+                      <a:r>
+                        <a:rPr lang="en-US" sz="1400" dirty="0" smtClean="0"/>
+                        <a:t>Main Menu</a:t>
+                      </a:r>
+                      <a:r>
+                        <a:rPr lang="en-US" sz="1400" baseline="0" dirty="0" smtClean="0"/>
+                        <a:t> + Level 1 themes, improve </a:t>
+                      </a:r>
+                      <a:r>
+                        <a:rPr lang="en-US" sz="1400" baseline="0" dirty="0" err="1" smtClean="0"/>
+                        <a:t>Lua</a:t>
+                      </a:r>
+                      <a:r>
+                        <a:rPr lang="en-US" sz="1400" baseline="0" dirty="0" smtClean="0"/>
+                        <a:t> integration</a:t>
+                      </a:r>
+                      <a:endParaRPr lang="en-US" sz="1400" dirty="0" smtClean="0"/>
+                    </a:p>
+                  </a:txBody>
+                  <a:tcPr/>
+                </a:tc>
+                <a:tc>
+                  <a:txBody>
+                    <a:bodyPr/>
+                    <a:lstStyle/>
+                    <a:p>
+                      <a:pPr algn="ctr"/>
+                      <a:r>
+                        <a:rPr lang="en-US" sz="1400" dirty="0" smtClean="0"/>
+                        <a:t>Make</a:t>
+                      </a:r>
+                      <a:r>
+                        <a:rPr lang="en-US" sz="1400" baseline="0" dirty="0" smtClean="0"/>
+                        <a:t> levels with GUI</a:t>
+                      </a:r>
+                      <a:endParaRPr lang="en-US" sz="1400" dirty="0"/>
+                    </a:p>
+                  </a:txBody>
+                  <a:tcPr/>
+                </a:tc>
+                <a:tc>
+                  <a:txBody>
+                    <a:bodyPr/>
+                    <a:lstStyle/>
+                    <a:p>
+                      <a:pPr algn="ctr"/>
+                      <a:r>
+                        <a:rPr lang="en-US" sz="1400" dirty="0" err="1" smtClean="0"/>
+                        <a:t>Lua</a:t>
+                      </a:r>
+                      <a:r>
+                        <a:rPr lang="en-US" sz="1400" dirty="0" smtClean="0"/>
+                        <a:t> Delegates</a:t>
+                      </a:r>
+                      <a:endParaRPr lang="en-US" sz="1400" dirty="0"/>
+                    </a:p>
+                  </a:txBody>
+                  <a:tcPr/>
+                </a:tc>
+                <a:tc>
+                  <a:txBody>
+                    <a:bodyPr/>
+                    <a:lstStyle/>
+                    <a:p>
+                      <a:pPr algn="ctr"/>
+                      <a:r>
+                        <a:rPr lang="en-US" sz="1400" dirty="0" smtClean="0"/>
+                        <a:t>Prototype</a:t>
+                      </a:r>
+                      <a:r>
+                        <a:rPr lang="en-US" sz="1400" baseline="0" dirty="0" smtClean="0"/>
+                        <a:t> Analysis</a:t>
+                      </a:r>
+                      <a:endParaRPr lang="en-US" sz="1400" dirty="0"/>
+                    </a:p>
+                  </a:txBody>
+                  <a:tcPr/>
+                </a:tc>
+                <a:tc>
+                  <a:txBody>
+                    <a:bodyPr/>
+                    <a:lstStyle/>
+                    <a:p>
+                      <a:pPr algn="ctr"/>
+                      <a:r>
+                        <a:rPr lang="en-US" sz="1400" dirty="0" smtClean="0"/>
+                        <a:t>Prototype Analysis</a:t>
+                      </a:r>
+                      <a:endParaRPr lang="en-US" sz="1400" dirty="0"/>
+                    </a:p>
+                  </a:txBody>
+                  <a:tcPr/>
+                </a:tc>
+                <a:tc>
+                  <a:txBody>
+                    <a:bodyPr/>
+                    <a:lstStyle/>
+                    <a:p>
+                      <a:pPr algn="ctr"/>
+                      <a:r>
+                        <a:rPr lang="en-US" sz="1400" dirty="0" smtClean="0"/>
+                        <a:t>Finalize</a:t>
+                      </a:r>
+                      <a:r>
+                        <a:rPr lang="en-US" sz="1400" baseline="0" dirty="0" smtClean="0"/>
+                        <a:t> player animations, enemy animations</a:t>
+                      </a:r>
+                      <a:endParaRPr lang="en-US" sz="1400" dirty="0"/>
+                    </a:p>
+                  </a:txBody>
+                  <a:tcPr/>
+                </a:tc>
+              </a:tr>
+              <a:tr h="875811">
+                <a:tc>
+                  <a:txBody>
+                    <a:bodyPr/>
+                    <a:lstStyle/>
+                    <a:p>
+                      <a:pPr algn="ctr"/>
+                      <a:r>
+                        <a:rPr lang="en-US" sz="1400" b="1" dirty="0" smtClean="0">
+                          <a:solidFill>
+                            <a:schemeClr val="bg1"/>
+                          </a:solidFill>
+                        </a:rPr>
+                        <a:t>Week 13</a:t>
+                      </a:r>
+                      <a:endParaRPr lang="en-US" sz="1400" b="1" dirty="0">
+                        <a:solidFill>
+                          <a:schemeClr val="bg1"/>
+                        </a:solidFill>
+                      </a:endParaRPr>
+                    </a:p>
+                  </a:txBody>
+                  <a:tcPr/>
+                </a:tc>
+                <a:tc>
+                  <a:txBody>
+                    <a:bodyPr/>
+                    <a:lstStyle/>
+                    <a:p>
+                      <a:pPr algn="ctr"/>
+                      <a:r>
+                        <a:rPr lang="en-US" sz="1400" dirty="0" smtClean="0"/>
+                        <a:t>In-Engine</a:t>
+                      </a:r>
+                      <a:r>
+                        <a:rPr lang="en-US" sz="1400" baseline="0" dirty="0" smtClean="0"/>
+                        <a:t> Prototype Crunch</a:t>
+                      </a:r>
+                      <a:endParaRPr lang="en-US" sz="1400" dirty="0"/>
+                    </a:p>
+                  </a:txBody>
+                  <a:tcPr/>
+                </a:tc>
+                <a:tc>
+                  <a:txBody>
+                    <a:bodyPr/>
+                    <a:lstStyle/>
+                    <a:p>
+                      <a:pPr algn="ctr"/>
+                      <a:r>
+                        <a:rPr lang="en-US" sz="1400" dirty="0" smtClean="0"/>
+                        <a:t>Debug</a:t>
+                      </a:r>
+                      <a:r>
+                        <a:rPr lang="en-US" sz="1400" baseline="0" dirty="0" smtClean="0"/>
+                        <a:t> tools</a:t>
+                      </a:r>
+                      <a:endParaRPr lang="en-US" sz="1400" dirty="0"/>
+                    </a:p>
+                  </a:txBody>
+                  <a:tcPr/>
+                </a:tc>
+                <a:tc>
+                  <a:txBody>
+                    <a:bodyPr/>
+                    <a:lstStyle/>
+                    <a:p>
+                      <a:pPr marL="0" marR="0" indent="0" algn="ctr" defTabSz="457200" rtl="0" eaLnBrk="1" fontAlgn="auto" latinLnBrk="0" hangingPunct="1">
+                        <a:lnSpc>
+                          <a:spcPct val="100000"/>
+                        </a:lnSpc>
+                        <a:spcBef>
+                          <a:spcPts val="0"/>
+                        </a:spcBef>
+                        <a:spcAft>
+                          <a:spcPts val="0"/>
+                        </a:spcAft>
+                        <a:buClrTx/>
+                        <a:buSzTx/>
+                        <a:buFontTx/>
+                        <a:buNone/>
+                        <a:tabLst/>
+                        <a:defRPr/>
+                      </a:pPr>
+                      <a:r>
+                        <a:rPr lang="en-US" sz="1400" dirty="0" smtClean="0"/>
+                        <a:t>In-Engine</a:t>
+                      </a:r>
+                      <a:r>
+                        <a:rPr lang="en-US" sz="1400" baseline="0" dirty="0" smtClean="0"/>
+                        <a:t> Prototype Crunch</a:t>
+                      </a:r>
+                      <a:endParaRPr lang="en-US" sz="1400" dirty="0" smtClean="0"/>
+                    </a:p>
+                  </a:txBody>
+                  <a:tcPr/>
+                </a:tc>
+                <a:tc>
+                  <a:txBody>
+                    <a:bodyPr/>
+                    <a:lstStyle/>
+                    <a:p>
+                      <a:pPr marL="0" marR="0" indent="0" algn="ctr" defTabSz="457200" rtl="0" eaLnBrk="1" fontAlgn="auto" latinLnBrk="0" hangingPunct="1">
+                        <a:lnSpc>
+                          <a:spcPct val="100000"/>
+                        </a:lnSpc>
+                        <a:spcBef>
+                          <a:spcPts val="0"/>
+                        </a:spcBef>
+                        <a:spcAft>
+                          <a:spcPts val="0"/>
+                        </a:spcAft>
+                        <a:buClrTx/>
+                        <a:buSzTx/>
+                        <a:buFontTx/>
+                        <a:buNone/>
+                        <a:tabLst/>
+                        <a:defRPr/>
+                      </a:pPr>
+                      <a:r>
+                        <a:rPr lang="en-US" sz="1400" dirty="0" smtClean="0"/>
+                        <a:t>In-Engine</a:t>
+                      </a:r>
+                      <a:r>
+                        <a:rPr lang="en-US" sz="1400" baseline="0" dirty="0" smtClean="0"/>
+                        <a:t> Prototype Crunch</a:t>
+                      </a:r>
+                      <a:endParaRPr lang="en-US" sz="1400" dirty="0" smtClean="0"/>
+                    </a:p>
+                  </a:txBody>
+                  <a:tcPr/>
+                </a:tc>
+                <a:tc>
+                  <a:txBody>
+                    <a:bodyPr/>
+                    <a:lstStyle/>
+                    <a:p>
+                      <a:pPr marL="0" marR="0" indent="0" algn="ctr" defTabSz="457200" rtl="0" eaLnBrk="1" fontAlgn="auto" latinLnBrk="0" hangingPunct="1">
+                        <a:lnSpc>
+                          <a:spcPct val="100000"/>
+                        </a:lnSpc>
+                        <a:spcBef>
+                          <a:spcPts val="0"/>
+                        </a:spcBef>
+                        <a:spcAft>
+                          <a:spcPts val="0"/>
+                        </a:spcAft>
+                        <a:buClrTx/>
+                        <a:buSzTx/>
+                        <a:buFontTx/>
+                        <a:buNone/>
+                        <a:tabLst/>
+                        <a:defRPr/>
+                      </a:pPr>
+                      <a:r>
+                        <a:rPr lang="en-US" sz="1400" dirty="0" smtClean="0"/>
+                        <a:t>In-Engine</a:t>
+                      </a:r>
+                      <a:r>
+                        <a:rPr lang="en-US" sz="1400" baseline="0" dirty="0" smtClean="0"/>
+                        <a:t> Prototype Crunch</a:t>
+                      </a:r>
+                      <a:endParaRPr lang="en-US" sz="1400" dirty="0" smtClean="0"/>
+                    </a:p>
+                  </a:txBody>
+                  <a:tcPr/>
+                </a:tc>
+                <a:tc>
+                  <a:txBody>
+                    <a:bodyPr/>
+                    <a:lstStyle/>
+                    <a:p>
+                      <a:pPr marL="0" marR="0" indent="0" algn="ctr" defTabSz="457200" rtl="0" eaLnBrk="1" fontAlgn="auto" latinLnBrk="0" hangingPunct="1">
+                        <a:lnSpc>
+                          <a:spcPct val="100000"/>
+                        </a:lnSpc>
+                        <a:spcBef>
+                          <a:spcPts val="0"/>
+                        </a:spcBef>
+                        <a:spcAft>
+                          <a:spcPts val="0"/>
+                        </a:spcAft>
+                        <a:buClrTx/>
+                        <a:buSzTx/>
+                        <a:buFontTx/>
+                        <a:buNone/>
+                        <a:tabLst/>
+                        <a:defRPr/>
+                      </a:pPr>
+                      <a:r>
+                        <a:rPr lang="en-US" sz="1400" dirty="0" smtClean="0"/>
+                        <a:t>In-Engine</a:t>
+                      </a:r>
+                      <a:r>
+                        <a:rPr lang="en-US" sz="1400" baseline="0" dirty="0" smtClean="0"/>
+                        <a:t> Prototype Crunch</a:t>
+                      </a:r>
+                      <a:endParaRPr lang="en-US" sz="1400" dirty="0" smtClean="0"/>
+                    </a:p>
+                  </a:txBody>
+                  <a:tcPr/>
+                </a:tc>
+                <a:tc>
+                  <a:txBody>
+                    <a:bodyPr/>
+                    <a:lstStyle/>
+                    <a:p>
+                      <a:pPr marL="0" marR="0" indent="0" algn="ctr" defTabSz="457200" rtl="0" eaLnBrk="1" fontAlgn="auto" latinLnBrk="0" hangingPunct="1">
+                        <a:lnSpc>
+                          <a:spcPct val="100000"/>
+                        </a:lnSpc>
+                        <a:spcBef>
+                          <a:spcPts val="0"/>
+                        </a:spcBef>
+                        <a:spcAft>
+                          <a:spcPts val="0"/>
+                        </a:spcAft>
+                        <a:buClrTx/>
+                        <a:buSzTx/>
+                        <a:buFontTx/>
+                        <a:buNone/>
+                        <a:tabLst/>
+                        <a:defRPr/>
+                      </a:pPr>
+                      <a:r>
+                        <a:rPr lang="en-US" sz="1400" dirty="0" smtClean="0"/>
+                        <a:t>Tile map art, enemy animations</a:t>
+                      </a:r>
+                    </a:p>
+                  </a:txBody>
+                  <a:tcPr/>
+                </a:tc>
+              </a:tr>
+              <a:tr h="875811">
+                <a:tc>
+                  <a:txBody>
+                    <a:bodyPr/>
+                    <a:lstStyle/>
+                    <a:p>
+                      <a:pPr algn="ctr"/>
+                      <a:r>
+                        <a:rPr lang="en-US" sz="1400" b="1" dirty="0" smtClean="0">
+                          <a:solidFill>
+                            <a:schemeClr val="bg1"/>
+                          </a:solidFill>
+                        </a:rPr>
+                        <a:t>Week 14</a:t>
+                      </a:r>
+                      <a:endParaRPr lang="en-US" sz="1400" b="1" dirty="0">
+                        <a:solidFill>
+                          <a:schemeClr val="bg1"/>
+                        </a:solidFill>
+                      </a:endParaRPr>
+                    </a:p>
+                  </a:txBody>
+                  <a:tcPr/>
+                </a:tc>
+                <a:tc>
+                  <a:txBody>
+                    <a:bodyPr/>
+                    <a:lstStyle/>
+                    <a:p>
+                      <a:pPr marL="0" marR="0" indent="0" algn="ctr" defTabSz="457200" rtl="0" eaLnBrk="1" fontAlgn="auto" latinLnBrk="0" hangingPunct="1">
+                        <a:lnSpc>
+                          <a:spcPct val="100000"/>
+                        </a:lnSpc>
+                        <a:spcBef>
+                          <a:spcPts val="0"/>
+                        </a:spcBef>
+                        <a:spcAft>
+                          <a:spcPts val="0"/>
+                        </a:spcAft>
+                        <a:buClrTx/>
+                        <a:buSzTx/>
+                        <a:buFontTx/>
+                        <a:buNone/>
+                        <a:tabLst/>
+                        <a:defRPr/>
+                      </a:pPr>
+                      <a:r>
+                        <a:rPr lang="en-US" sz="1400" dirty="0" smtClean="0"/>
+                        <a:t>In-Engine</a:t>
+                      </a:r>
+                      <a:r>
+                        <a:rPr lang="en-US" sz="1400" baseline="0" dirty="0" smtClean="0"/>
+                        <a:t> Prototype Crunch</a:t>
+                      </a:r>
+                      <a:endParaRPr lang="en-US" sz="1400" dirty="0" smtClean="0"/>
+                    </a:p>
+                  </a:txBody>
+                  <a:tcPr/>
+                </a:tc>
+                <a:tc>
+                  <a:txBody>
+                    <a:bodyPr/>
+                    <a:lstStyle/>
+                    <a:p>
+                      <a:pPr algn="ctr"/>
+                      <a:r>
+                        <a:rPr lang="en-US" sz="1400" dirty="0" smtClean="0"/>
+                        <a:t>In-Engine Prototype Crunch</a:t>
+                      </a:r>
+                      <a:endParaRPr lang="en-US" sz="1400" dirty="0"/>
+                    </a:p>
+                  </a:txBody>
+                  <a:tcPr/>
+                </a:tc>
+                <a:tc>
+                  <a:txBody>
+                    <a:bodyPr/>
+                    <a:lstStyle/>
+                    <a:p>
+                      <a:pPr marL="0" marR="0" indent="0" algn="ctr" defTabSz="457200" rtl="0" eaLnBrk="1" fontAlgn="auto" latinLnBrk="0" hangingPunct="1">
+                        <a:lnSpc>
+                          <a:spcPct val="100000"/>
+                        </a:lnSpc>
+                        <a:spcBef>
+                          <a:spcPts val="0"/>
+                        </a:spcBef>
+                        <a:spcAft>
+                          <a:spcPts val="0"/>
+                        </a:spcAft>
+                        <a:buClrTx/>
+                        <a:buSzTx/>
+                        <a:buFontTx/>
+                        <a:buNone/>
+                        <a:tabLst/>
+                        <a:defRPr/>
+                      </a:pPr>
+                      <a:r>
+                        <a:rPr lang="en-US" sz="1400" dirty="0" smtClean="0"/>
+                        <a:t>In-Engine</a:t>
+                      </a:r>
+                      <a:r>
+                        <a:rPr lang="en-US" sz="1400" baseline="0" dirty="0" smtClean="0"/>
+                        <a:t> Prototype Crunch</a:t>
+                      </a:r>
+                      <a:endParaRPr lang="en-US" sz="1400" dirty="0" smtClean="0"/>
+                    </a:p>
+                  </a:txBody>
+                  <a:tcPr/>
+                </a:tc>
+                <a:tc>
+                  <a:txBody>
+                    <a:bodyPr/>
+                    <a:lstStyle/>
+                    <a:p>
+                      <a:pPr marL="0" marR="0" indent="0" algn="ctr" defTabSz="457200" rtl="0" eaLnBrk="1" fontAlgn="auto" latinLnBrk="0" hangingPunct="1">
+                        <a:lnSpc>
+                          <a:spcPct val="100000"/>
+                        </a:lnSpc>
+                        <a:spcBef>
+                          <a:spcPts val="0"/>
+                        </a:spcBef>
+                        <a:spcAft>
+                          <a:spcPts val="0"/>
+                        </a:spcAft>
+                        <a:buClrTx/>
+                        <a:buSzTx/>
+                        <a:buFontTx/>
+                        <a:buNone/>
+                        <a:tabLst/>
+                        <a:defRPr/>
+                      </a:pPr>
+                      <a:r>
+                        <a:rPr lang="en-US" sz="1400" dirty="0" smtClean="0"/>
+                        <a:t>In-Engine</a:t>
+                      </a:r>
+                      <a:r>
+                        <a:rPr lang="en-US" sz="1400" baseline="0" dirty="0" smtClean="0"/>
+                        <a:t> Prototype Crunch</a:t>
+                      </a:r>
+                      <a:endParaRPr lang="en-US" sz="1400" dirty="0" smtClean="0"/>
+                    </a:p>
+                  </a:txBody>
+                  <a:tcPr/>
+                </a:tc>
+                <a:tc>
+                  <a:txBody>
+                    <a:bodyPr/>
+                    <a:lstStyle/>
+                    <a:p>
+                      <a:pPr marL="0" marR="0" indent="0" algn="ctr" defTabSz="457200" rtl="0" eaLnBrk="1" fontAlgn="auto" latinLnBrk="0" hangingPunct="1">
+                        <a:lnSpc>
+                          <a:spcPct val="100000"/>
+                        </a:lnSpc>
+                        <a:spcBef>
+                          <a:spcPts val="0"/>
+                        </a:spcBef>
+                        <a:spcAft>
+                          <a:spcPts val="0"/>
+                        </a:spcAft>
+                        <a:buClrTx/>
+                        <a:buSzTx/>
+                        <a:buFontTx/>
+                        <a:buNone/>
+                        <a:tabLst/>
+                        <a:defRPr/>
+                      </a:pPr>
+                      <a:r>
+                        <a:rPr lang="en-US" sz="1400" dirty="0" smtClean="0"/>
+                        <a:t>In-Engine</a:t>
+                      </a:r>
+                      <a:r>
+                        <a:rPr lang="en-US" sz="1400" baseline="0" dirty="0" smtClean="0"/>
+                        <a:t> Prototype Crunch</a:t>
+                      </a:r>
+                      <a:endParaRPr lang="en-US" sz="1400" dirty="0" smtClean="0"/>
+                    </a:p>
+                  </a:txBody>
+                  <a:tcPr/>
+                </a:tc>
+                <a:tc>
+                  <a:txBody>
+                    <a:bodyPr/>
+                    <a:lstStyle/>
+                    <a:p>
+                      <a:pPr marL="0" marR="0" indent="0" algn="ctr" defTabSz="457200" rtl="0" eaLnBrk="1" fontAlgn="auto" latinLnBrk="0" hangingPunct="1">
+                        <a:lnSpc>
+                          <a:spcPct val="100000"/>
+                        </a:lnSpc>
+                        <a:spcBef>
+                          <a:spcPts val="0"/>
+                        </a:spcBef>
+                        <a:spcAft>
+                          <a:spcPts val="0"/>
+                        </a:spcAft>
+                        <a:buClrTx/>
+                        <a:buSzTx/>
+                        <a:buFontTx/>
+                        <a:buNone/>
+                        <a:tabLst/>
+                        <a:defRPr/>
+                      </a:pPr>
+                      <a:r>
+                        <a:rPr lang="en-US" sz="1400" dirty="0" smtClean="0"/>
+                        <a:t>In-Engine</a:t>
+                      </a:r>
+                      <a:r>
+                        <a:rPr lang="en-US" sz="1400" baseline="0" dirty="0" smtClean="0"/>
+                        <a:t> Prototype Crunch</a:t>
+                      </a:r>
+                      <a:endParaRPr lang="en-US" sz="1400" dirty="0" smtClean="0"/>
+                    </a:p>
+                  </a:txBody>
+                  <a:tcPr/>
+                </a:tc>
+                <a:tc>
+                  <a:txBody>
+                    <a:bodyPr/>
+                    <a:lstStyle/>
+                    <a:p>
+                      <a:pPr marL="0" marR="0" indent="0" algn="ctr" defTabSz="457200" rtl="0" eaLnBrk="1" fontAlgn="auto" latinLnBrk="0" hangingPunct="1">
+                        <a:lnSpc>
+                          <a:spcPct val="100000"/>
+                        </a:lnSpc>
+                        <a:spcBef>
+                          <a:spcPts val="0"/>
+                        </a:spcBef>
+                        <a:spcAft>
+                          <a:spcPts val="0"/>
+                        </a:spcAft>
+                        <a:buClrTx/>
+                        <a:buSzTx/>
+                        <a:buFontTx/>
+                        <a:buNone/>
+                        <a:tabLst/>
+                        <a:defRPr/>
+                      </a:pPr>
+                      <a:r>
+                        <a:rPr lang="en-US" sz="1400" dirty="0" smtClean="0"/>
+                        <a:t>Tile map art, enemy animations</a:t>
+                      </a:r>
+                    </a:p>
+                  </a:txBody>
+                  <a:tcPr/>
+                </a:tc>
+              </a:tr>
+            </a:tbl>
+          </a:graphicData>
+        </a:graphic>
+      </p:graphicFrame>
     </p:spTree>
     <p:extLst>
       <p:ext uri="{BB962C8B-B14F-4D97-AF65-F5344CB8AC3E}">
@@ -7518,7 +8627,7 @@
         </p:nvSpPr>
         <p:spPr>
           <a:xfrm>
-            <a:off x="646112" y="452718"/>
+            <a:off x="874711" y="163960"/>
             <a:ext cx="9403742" cy="1937556"/>
           </a:xfrm>
         </p:spPr>
@@ -7547,15 +8656,77 @@
         </p:nvSpPr>
         <p:spPr>
           <a:xfrm>
-            <a:off x="1103312" y="2390274"/>
-            <a:ext cx="8946541" cy="3858125"/>
+            <a:off x="1103312" y="1957138"/>
+            <a:ext cx="8946541" cy="4291262"/>
           </a:xfrm>
         </p:spPr>
         <p:txBody>
           <a:bodyPr/>
           <a:lstStyle/>
           <a:p>
-            <a:endParaRPr lang="en-US" dirty="0"/>
+            <a:r>
+              <a:rPr lang="en-US" dirty="0" smtClean="0"/>
+              <a:t>Engine: </a:t>
+            </a:r>
+            <a:r>
+              <a:rPr lang="en-US" dirty="0" smtClean="0"/>
+              <a:t>-6%</a:t>
+            </a:r>
+            <a:endParaRPr lang="en-US" dirty="0" smtClean="0"/>
+          </a:p>
+          <a:p>
+            <a:r>
+              <a:rPr lang="en-US" dirty="0" smtClean="0"/>
+              <a:t>Level Editor / Art Pipeline: +4%</a:t>
+            </a:r>
+          </a:p>
+          <a:p>
+            <a:r>
+              <a:rPr lang="en-US" dirty="0" smtClean="0"/>
+              <a:t>Game Play: +0%</a:t>
+            </a:r>
+          </a:p>
+          <a:p>
+            <a:r>
+              <a:rPr lang="en-US" dirty="0" smtClean="0"/>
+              <a:t>Testing: </a:t>
+            </a:r>
+            <a:r>
+              <a:rPr lang="en-US" dirty="0" smtClean="0"/>
+              <a:t>-4%</a:t>
+            </a:r>
+            <a:endParaRPr lang="en-US" dirty="0" smtClean="0"/>
+          </a:p>
+          <a:p>
+            <a:r>
+              <a:rPr lang="en-US" dirty="0" smtClean="0"/>
+              <a:t>Team &amp; Presentation: </a:t>
+            </a:r>
+            <a:r>
+              <a:rPr lang="en-US" dirty="0" smtClean="0"/>
+              <a:t>+2%</a:t>
+            </a:r>
+            <a:endParaRPr lang="en-US" dirty="0" smtClean="0"/>
+          </a:p>
+          <a:p>
+            <a:r>
+              <a:rPr lang="en-US" dirty="0" smtClean="0"/>
+              <a:t>Project Modifiers: -2% (team size of 6</a:t>
+            </a:r>
+            <a:r>
+              <a:rPr lang="en-US" dirty="0" smtClean="0"/>
+              <a:t>)</a:t>
+            </a:r>
+          </a:p>
+          <a:p>
+            <a:endParaRPr lang="en-US" dirty="0" smtClean="0"/>
+          </a:p>
+          <a:p>
+            <a:r>
+              <a:rPr lang="en-US" sz="3600" dirty="0" smtClean="0"/>
+              <a:t>Final Score: 69%</a:t>
+            </a:r>
+            <a:endParaRPr lang="en-US" sz="3600" dirty="0"/>
           </a:p>
         </p:txBody>
       </p:sp>
@@ -7569,13 +8740,13 @@
   <p:clrMapOvr>
     <a:masterClrMapping/>
   </p:clrMapOvr>
-  <mc:AlternateContent xmlns:mc="http://schemas.openxmlformats.org/markup-compatibility/2006">
-    <mc:Choice xmlns:p14="http://schemas.microsoft.com/office/powerpoint/2010/main" Requires="p14">
+  <mc:AlternateContent xmlns:mc="http://schemas.openxmlformats.org/markup-compatibility/2006" xmlns:p14="http://schemas.microsoft.com/office/powerpoint/2010/main">
+    <mc:Choice Requires="p14">
       <p:transition spd="med" p14:dur="700">
         <p:fade/>
       </p:transition>
     </mc:Choice>
-    <mc:Fallback>
+    <mc:Fallback xmlns="">
       <p:transition spd="med">
         <p:fade/>
       </p:transition>
@@ -7743,13 +8914,13 @@
   <p:clrMapOvr>
     <a:masterClrMapping/>
   </p:clrMapOvr>
-  <mc:AlternateContent xmlns:mc="http://schemas.openxmlformats.org/markup-compatibility/2006">
-    <mc:Choice xmlns:p14="http://schemas.microsoft.com/office/powerpoint/2010/main" Requires="p14">
+  <mc:AlternateContent xmlns:mc="http://schemas.openxmlformats.org/markup-compatibility/2006" xmlns:p14="http://schemas.microsoft.com/office/powerpoint/2010/main">
+    <mc:Choice Requires="p14">
       <p:transition spd="med" p14:dur="700">
         <p:fade/>
       </p:transition>
     </mc:Choice>
-    <mc:Fallback>
+    <mc:Fallback xmlns="">
       <p:transition spd="med">
         <p:fade/>
       </p:transition>
@@ -8576,7 +9747,6 @@
               <a:rPr lang="en-US" sz="2800" dirty="0" smtClean="0"/>
               <a:t>Browsed the school forums for Sound students with no luck</a:t>
             </a:r>
-            <a:endParaRPr lang="en-US" sz="2800" dirty="0" smtClean="0"/>
           </a:p>
           <a:p>
             <a:r>

</xml_diff>